<commit_message>
Rename old Module 9 to module 10
</commit_message>
<xml_diff>
--- a/Documents/QA Powerpoints/Module 7.pptx
+++ b/Documents/QA Powerpoints/Module 7.pptx
@@ -9727,21 +9727,21 @@
           <a:lstStyle/>
           <a:p>
             <a:r>
-              <a:rPr lang="en-US" smtClean="0"/>
+              <a:rPr lang="en-US" dirty="0" smtClean="0"/>
               <a:t/>
             </a:r>
             <a:br>
-              <a:rPr lang="en-US" smtClean="0"/>
+              <a:rPr lang="en-US" dirty="0" smtClean="0"/>
             </a:br>
             <a:r>
-              <a:rPr lang="en-US" smtClean="0"/>
+              <a:rPr lang="en-US" dirty="0" smtClean="0"/>
               <a:t>Web Resources</a:t>
             </a:r>
             <a:br>
-              <a:rPr lang="en-US" smtClean="0"/>
+              <a:rPr lang="en-US" dirty="0" smtClean="0"/>
             </a:br>
             <a:r>
-              <a:rPr lang="en-US" smtClean="0"/>
+              <a:rPr lang="en-US" dirty="0" smtClean="0"/>
               <a:t>Accessing OData services</a:t>
             </a:r>
             <a:endParaRPr lang="en-US" dirty="0"/>
@@ -9830,8 +9830,28 @@
           <a:lstStyle/>
           <a:p>
             <a:r>
-              <a:rPr lang="en-GB" smtClean="0"/>
-              <a:t>Using Chrome Postman to query an ODATA</a:t>
+              <a:rPr lang="en-GB" dirty="0" smtClean="0"/>
+              <a:t>Using </a:t>
+            </a:r>
+            <a:r>
+              <a:rPr lang="en-GB" dirty="0" err="1" smtClean="0"/>
+              <a:t>CRMRestBuilder</a:t>
+            </a:r>
+            <a:r>
+              <a:rPr lang="en-GB" dirty="0" smtClean="0"/>
+              <a:t> to </a:t>
+            </a:r>
+            <a:r>
+              <a:rPr lang="en-GB" dirty="0" smtClean="0"/>
+              <a:t>query an </a:t>
+            </a:r>
+            <a:r>
+              <a:rPr lang="en-GB" dirty="0" smtClean="0"/>
+              <a:t>ODATA from </a:t>
+            </a:r>
+            <a:r>
+              <a:rPr lang="en-GB" dirty="0" err="1" smtClean="0"/>
+              <a:t>Javascript</a:t>
             </a:r>
             <a:endParaRPr lang="en-GB" dirty="0"/>
           </a:p>
@@ -15588,23 +15608,6 @@
 </file>
 
 <file path=customXml/item1.xml><?xml version="1.0" encoding="utf-8"?>
-<p:properties xmlns:p="http://schemas.microsoft.com/office/2006/metadata/properties" xmlns:xsi="http://www.w3.org/2001/XMLSchema-instance" xmlns:pc="http://schemas.microsoft.com/office/infopath/2007/PartnerControls">
-  <documentManagement>
-    <SequenceNumber xmlns="E91B78A9-CB0B-4A6B-986C-C3FD7F78ECCA">8</SequenceNumber>
-    <IsBuildFile xmlns="E91B78A9-CB0B-4A6B-986C-C3FD7F78ECCA" xsi:nil="true"/>
-    <BookTypeField0 xmlns="E91B78A9-CB0B-4A6B-986C-C3FD7F78ECCA">
-      <Terms xmlns="http://schemas.microsoft.com/office/infopath/2007/PartnerControls">
-        <TermInfo xmlns="http://schemas.microsoft.com/office/infopath/2007/PartnerControls">
-          <TermName xmlns="http://schemas.microsoft.com/office/infopath/2007/PartnerControls">DG1</TermName>
-          <TermId xmlns="http://schemas.microsoft.com/office/infopath/2007/PartnerControls">2c36b281-5453-4638-b94e-382d16c3a3ae</TermId>
-        </TermInfo>
-      </Terms>
-    </BookTypeField0>
-  </documentManagement>
-</p:properties>
-</file>
-
-<file path=customXml/item2.xml><?xml version="1.0" encoding="utf-8"?>
 <ct:contentTypeSchema xmlns:ct="http://schemas.microsoft.com/office/2006/metadata/contentType" xmlns:ma="http://schemas.microsoft.com/office/2006/metadata/properties/metaAttributes" ct:_="" ma:_="" ma:contentTypeName="Courseware" ma:contentTypeID="0x010100F0967B7CEE8D417F966757887D9466FB00EFF839BC99765C44ABF57D628FED732F" ma:contentTypeVersion="0" ma:contentTypeDescription="Base content type which represents courseware documents" ma:contentTypeScope="" ma:versionID="1b62c6efd6b4f2b82e31975c7afb7183">
   <xsd:schema xmlns:xsd="http://www.w3.org/2001/XMLSchema" xmlns:xs="http://www.w3.org/2001/XMLSchema" xmlns:p="http://schemas.microsoft.com/office/2006/metadata/properties" xmlns:ns2="E91B78A9-CB0B-4A6B-986C-C3FD7F78ECCA" targetNamespace="http://schemas.microsoft.com/office/2006/metadata/properties" ma:root="true" ma:fieldsID="e20d87a58502fcd64504fc29d9a55e54" ns2:_="">
     <xsd:import namespace="E91B78A9-CB0B-4A6B-986C-C3FD7F78ECCA"/>
@@ -15744,6 +15747,23 @@
 </ct:contentTypeSchema>
 </file>
 
+<file path=customXml/item2.xml><?xml version="1.0" encoding="utf-8"?>
+<p:properties xmlns:p="http://schemas.microsoft.com/office/2006/metadata/properties" xmlns:xsi="http://www.w3.org/2001/XMLSchema-instance" xmlns:pc="http://schemas.microsoft.com/office/infopath/2007/PartnerControls">
+  <documentManagement>
+    <SequenceNumber xmlns="E91B78A9-CB0B-4A6B-986C-C3FD7F78ECCA">8</SequenceNumber>
+    <IsBuildFile xmlns="E91B78A9-CB0B-4A6B-986C-C3FD7F78ECCA" xsi:nil="true"/>
+    <BookTypeField0 xmlns="E91B78A9-CB0B-4A6B-986C-C3FD7F78ECCA">
+      <Terms xmlns="http://schemas.microsoft.com/office/infopath/2007/PartnerControls">
+        <TermInfo xmlns="http://schemas.microsoft.com/office/infopath/2007/PartnerControls">
+          <TermName xmlns="http://schemas.microsoft.com/office/infopath/2007/PartnerControls">DG1</TermName>
+          <TermId xmlns="http://schemas.microsoft.com/office/infopath/2007/PartnerControls">2c36b281-5453-4638-b94e-382d16c3a3ae</TermId>
+        </TermInfo>
+      </Terms>
+    </BookTypeField0>
+  </documentManagement>
+</p:properties>
+</file>
+
 <file path=customXml/item3.xml><?xml version="1.0" encoding="utf-8"?>
 <?mso-contentType ?>
 <FormTemplates xmlns="http://schemas.microsoft.com/sharepoint/v3/contenttype/forms">
@@ -15754,22 +15774,6 @@
 </file>
 
 <file path=customXml/itemProps1.xml><?xml version="1.0" encoding="utf-8"?>
-<ds:datastoreItem xmlns:ds="http://schemas.openxmlformats.org/officeDocument/2006/customXml" ds:itemID="{FDF61CDE-5C2D-40F3-BA0D-9FBD268D7D47}">
-  <ds:schemaRefs>
-    <ds:schemaRef ds:uri="http://schemas.openxmlformats.org/package/2006/metadata/core-properties"/>
-    <ds:schemaRef ds:uri="http://purl.org/dc/elements/1.1/"/>
-    <ds:schemaRef ds:uri="http://schemas.microsoft.com/office/infopath/2007/PartnerControls"/>
-    <ds:schemaRef ds:uri="E91B78A9-CB0B-4A6B-986C-C3FD7F78ECCA"/>
-    <ds:schemaRef ds:uri="http://schemas.microsoft.com/office/2006/metadata/properties"/>
-    <ds:schemaRef ds:uri="http://purl.org/dc/terms/"/>
-    <ds:schemaRef ds:uri="http://schemas.microsoft.com/office/2006/documentManagement/types"/>
-    <ds:schemaRef ds:uri="http://www.w3.org/XML/1998/namespace"/>
-    <ds:schemaRef ds:uri="http://purl.org/dc/dcmitype/"/>
-  </ds:schemaRefs>
-</ds:datastoreItem>
-</file>
-
-<file path=customXml/itemProps2.xml><?xml version="1.0" encoding="utf-8"?>
 <ds:datastoreItem xmlns:ds="http://schemas.openxmlformats.org/officeDocument/2006/customXml" ds:itemID="{E72A9B99-250B-458F-9B9D-60F8FEE6B5D9}">
   <ds:schemaRefs>
     <ds:schemaRef ds:uri="http://schemas.microsoft.com/office/2006/metadata/contentType"/>
@@ -15787,6 +15791,22 @@
 </ds:datastoreItem>
 </file>
 
+<file path=customXml/itemProps2.xml><?xml version="1.0" encoding="utf-8"?>
+<ds:datastoreItem xmlns:ds="http://schemas.openxmlformats.org/officeDocument/2006/customXml" ds:itemID="{FDF61CDE-5C2D-40F3-BA0D-9FBD268D7D47}">
+  <ds:schemaRefs>
+    <ds:schemaRef ds:uri="http://schemas.openxmlformats.org/package/2006/metadata/core-properties"/>
+    <ds:schemaRef ds:uri="http://purl.org/dc/elements/1.1/"/>
+    <ds:schemaRef ds:uri="http://schemas.microsoft.com/office/infopath/2007/PartnerControls"/>
+    <ds:schemaRef ds:uri="E91B78A9-CB0B-4A6B-986C-C3FD7F78ECCA"/>
+    <ds:schemaRef ds:uri="http://schemas.microsoft.com/office/2006/metadata/properties"/>
+    <ds:schemaRef ds:uri="http://purl.org/dc/terms/"/>
+    <ds:schemaRef ds:uri="http://schemas.microsoft.com/office/2006/documentManagement/types"/>
+    <ds:schemaRef ds:uri="http://www.w3.org/XML/1998/namespace"/>
+    <ds:schemaRef ds:uri="http://purl.org/dc/dcmitype/"/>
+  </ds:schemaRefs>
+</ds:datastoreItem>
+</file>
+
 <file path=customXml/itemProps3.xml><?xml version="1.0" encoding="utf-8"?>
 <ds:datastoreItem xmlns:ds="http://schemas.openxmlformats.org/officeDocument/2006/customXml" ds:itemID="{53E0CC68-5847-4DD2-8BB2-E33BE7AEF937}">
   <ds:schemaRefs>

</xml_diff>